<commit_message>
Added base for sample code for lab 05
</commit_message>
<xml_diff>
--- a/05_Storage/PV239-Xamarin-05_Storage.pptx
+++ b/05_Storage/PV239-Xamarin-05_Storage.pptx
@@ -5,15 +5,20 @@
     <p:sldMasterId id="2147483700" r:id="rId1"/>
   </p:sldMasterIdLst>
   <p:notesMasterIdLst>
-    <p:notesMasterId r:id="rId8"/>
+    <p:notesMasterId r:id="rId13"/>
   </p:notesMasterIdLst>
   <p:sldIdLst>
     <p:sldId id="256" r:id="rId2"/>
-    <p:sldId id="258" r:id="rId3"/>
-    <p:sldId id="259" r:id="rId4"/>
-    <p:sldId id="260" r:id="rId5"/>
-    <p:sldId id="261" r:id="rId6"/>
-    <p:sldId id="257" r:id="rId7"/>
+    <p:sldId id="394" r:id="rId3"/>
+    <p:sldId id="258" r:id="rId4"/>
+    <p:sldId id="259" r:id="rId5"/>
+    <p:sldId id="260" r:id="rId6"/>
+    <p:sldId id="261" r:id="rId7"/>
+    <p:sldId id="257" r:id="rId8"/>
+    <p:sldId id="396" r:id="rId9"/>
+    <p:sldId id="397" r:id="rId10"/>
+    <p:sldId id="398" r:id="rId11"/>
+    <p:sldId id="395" r:id="rId12"/>
   </p:sldIdLst>
   <p:sldSz cx="12192000" cy="6858000"/>
   <p:notesSz cx="6858000" cy="9144000"/>
@@ -202,7 +207,7 @@
           <a:p>
             <a:fld id="{48A795E8-66B5-4696-B483-F1F9FA0B53D4}" type="datetimeFigureOut">
               <a:rPr lang="cs-CZ" smtClean="0"/>
-              <a:t>24.03.2019</a:t>
+              <a:t>14.03.2022</a:t>
             </a:fld>
             <a:endParaRPr lang="cs-CZ"/>
           </a:p>
@@ -9263,7 +9268,7 @@
           <a:p>
             <a:fld id="{4AAD347D-5ACD-4C99-B74B-A9C85AD731AF}" type="datetimeFigureOut">
               <a:rPr lang="en-US" smtClean="0"/>
-              <a:t>2019-03-24</a:t>
+              <a:t>2022-03-14</a:t>
             </a:fld>
             <a:endParaRPr lang="en-US" dirty="0"/>
           </a:p>
@@ -9470,7 +9475,7 @@
           <a:p>
             <a:fld id="{4509A250-FF31-4206-8172-F9D3106AACB1}" type="datetimeFigureOut">
               <a:rPr lang="en-US" smtClean="0"/>
-              <a:t>2019-03-24</a:t>
+              <a:t>2022-03-14</a:t>
             </a:fld>
             <a:endParaRPr lang="en-US" dirty="0"/>
           </a:p>
@@ -9650,7 +9655,7 @@
           <a:p>
             <a:fld id="{4509A250-FF31-4206-8172-F9D3106AACB1}" type="datetimeFigureOut">
               <a:rPr lang="en-US" smtClean="0"/>
-              <a:t>2019-03-24</a:t>
+              <a:t>2022-03-14</a:t>
             </a:fld>
             <a:endParaRPr lang="en-US" dirty="0"/>
           </a:p>
@@ -9855,7 +9860,7 @@
           <a:p>
             <a:fld id="{4509A250-FF31-4206-8172-F9D3106AACB1}" type="datetimeFigureOut">
               <a:rPr lang="en-US" smtClean="0"/>
-              <a:t>2019-03-24</a:t>
+              <a:t>2022-03-14</a:t>
             </a:fld>
             <a:endParaRPr lang="en-US" dirty="0"/>
           </a:p>
@@ -18753,7 +18758,7 @@
           <a:p>
             <a:fld id="{9796027F-7875-4030-9381-8BD8C4F21935}" type="datetimeFigureOut">
               <a:rPr lang="en-US" smtClean="0"/>
-              <a:t>2019-03-24</a:t>
+              <a:t>2022-03-14</a:t>
             </a:fld>
             <a:endParaRPr lang="en-US" dirty="0"/>
           </a:p>
@@ -19027,7 +19032,7 @@
           <a:p>
             <a:fld id="{9796027F-7875-4030-9381-8BD8C4F21935}" type="datetimeFigureOut">
               <a:rPr lang="en-US" smtClean="0"/>
-              <a:t>2019-03-24</a:t>
+              <a:t>2022-03-14</a:t>
             </a:fld>
             <a:endParaRPr lang="en-US" dirty="0"/>
           </a:p>
@@ -19425,7 +19430,7 @@
           <a:p>
             <a:fld id="{9796027F-7875-4030-9381-8BD8C4F21935}" type="datetimeFigureOut">
               <a:rPr lang="en-US" smtClean="0"/>
-              <a:t>2019-03-24</a:t>
+              <a:t>2022-03-14</a:t>
             </a:fld>
             <a:endParaRPr lang="en-US" dirty="0"/>
           </a:p>
@@ -19543,7 +19548,7 @@
           <a:p>
             <a:fld id="{4509A250-FF31-4206-8172-F9D3106AACB1}" type="datetimeFigureOut">
               <a:rPr lang="en-US" smtClean="0"/>
-              <a:t>2019-03-24</a:t>
+              <a:t>2022-03-14</a:t>
             </a:fld>
             <a:endParaRPr lang="en-US" dirty="0"/>
           </a:p>
@@ -19638,7 +19643,7 @@
           <a:p>
             <a:fld id="{4509A250-FF31-4206-8172-F9D3106AACB1}" type="datetimeFigureOut">
               <a:rPr lang="en-US" smtClean="0"/>
-              <a:t>2019-03-24</a:t>
+              <a:t>2022-03-14</a:t>
             </a:fld>
             <a:endParaRPr lang="en-US" dirty="0"/>
           </a:p>
@@ -19928,7 +19933,7 @@
           <a:p>
             <a:fld id="{4509A250-FF31-4206-8172-F9D3106AACB1}" type="datetimeFigureOut">
               <a:rPr lang="en-US" smtClean="0"/>
-              <a:t>2019-03-24</a:t>
+              <a:t>2022-03-14</a:t>
             </a:fld>
             <a:endParaRPr lang="en-US" dirty="0"/>
           </a:p>
@@ -20208,7 +20213,7 @@
           <a:p>
             <a:fld id="{4509A250-FF31-4206-8172-F9D3106AACB1}" type="datetimeFigureOut">
               <a:rPr lang="en-US" smtClean="0"/>
-              <a:t>2019-03-24</a:t>
+              <a:t>2022-03-14</a:t>
             </a:fld>
             <a:endParaRPr lang="en-US" dirty="0"/>
           </a:p>
@@ -20458,7 +20463,7 @@
           <a:p>
             <a:fld id="{4AAD347D-5ACD-4C99-B74B-A9C85AD731AF}" type="datetimeFigureOut">
               <a:rPr lang="en-US" smtClean="0"/>
-              <a:t>2019-03-24</a:t>
+              <a:t>2022-03-14</a:t>
             </a:fld>
             <a:endParaRPr lang="en-US" dirty="0"/>
           </a:p>
@@ -21113,11 +21118,27 @@
               <a:rPr lang="sk-SK" dirty="0"/>
               <a:t>šek</a:t>
             </a:r>
+            <a:r>
+              <a:rPr lang="en-US" dirty="0"/>
+              <a:t>, </a:t>
+            </a:r>
+            <a:r>
+              <a:rPr lang="en-US" dirty="0" err="1"/>
+              <a:t>Ond</a:t>
+            </a:r>
+            <a:r>
+              <a:rPr lang="sk-SK" dirty="0" err="1"/>
+              <a:t>řej</a:t>
+            </a:r>
+            <a:r>
+              <a:rPr lang="sk-SK" dirty="0"/>
+              <a:t> Slimák</a:t>
+            </a:r>
           </a:p>
           <a:p>
             <a:r>
               <a:rPr lang="sk-SK" dirty="0"/>
-              <a:t>Microsoft MVP, Riganti s.r.o.</a:t>
+              <a:t>Riganti s.r.o.</a:t>
             </a:r>
             <a:endParaRPr lang="cs-CZ" dirty="0"/>
           </a:p>
@@ -21125,6 +21146,17 @@
             <a:r>
               <a:rPr lang="sk-SK" dirty="0" err="1"/>
               <a:t>roman.jasek</a:t>
+            </a:r>
+            <a:r>
+              <a:rPr lang="en-US" dirty="0"/>
+              <a:t>@riganti.cz</a:t>
+            </a:r>
+            <a:endParaRPr lang="sk-SK" dirty="0"/>
+          </a:p>
+          <a:p>
+            <a:r>
+              <a:rPr lang="sk-SK" dirty="0" err="1"/>
+              <a:t>ondrej.slimak</a:t>
             </a:r>
             <a:r>
               <a:rPr lang="en-US" dirty="0"/>
@@ -21258,7 +21290,709 @@
 </p:sld>
 </file>
 
+<file path=ppt/slides/slide10.xml><?xml version="1.0" encoding="utf-8"?>
+<p:sld xmlns:a="http://schemas.openxmlformats.org/drawingml/2006/main" xmlns:r="http://schemas.openxmlformats.org/officeDocument/2006/relationships" xmlns:p="http://schemas.openxmlformats.org/presentationml/2006/main">
+  <p:cSld>
+    <p:spTree>
+      <p:nvGrpSpPr>
+        <p:cNvPr id="1" name=""/>
+        <p:cNvGrpSpPr/>
+        <p:nvPr/>
+      </p:nvGrpSpPr>
+      <p:grpSpPr>
+        <a:xfrm>
+          <a:off x="0" y="0"/>
+          <a:ext cx="0" cy="0"/>
+          <a:chOff x="0" y="0"/>
+          <a:chExt cx="0" cy="0"/>
+        </a:xfrm>
+      </p:grpSpPr>
+      <p:sp>
+        <p:nvSpPr>
+          <p:cNvPr id="2" name="Title 1">
+            <a:extLst>
+              <a:ext uri="{FF2B5EF4-FFF2-40B4-BE49-F238E27FC236}">
+                <a16:creationId xmlns:a16="http://schemas.microsoft.com/office/drawing/2014/main" id="{129BBA9D-0C4D-4E43-B7C6-4260CA9A60CB}"/>
+              </a:ext>
+            </a:extLst>
+          </p:cNvPr>
+          <p:cNvSpPr>
+            <a:spLocks noGrp="1"/>
+          </p:cNvSpPr>
+          <p:nvPr>
+            <p:ph type="title"/>
+          </p:nvPr>
+        </p:nvSpPr>
+        <p:spPr/>
+        <p:txBody>
+          <a:bodyPr/>
+          <a:lstStyle/>
+          <a:p>
+            <a:r>
+              <a:rPr lang="en-US"/>
+              <a:t>lokalizace</a:t>
+            </a:r>
+          </a:p>
+        </p:txBody>
+      </p:sp>
+      <p:sp>
+        <p:nvSpPr>
+          <p:cNvPr id="3" name="Content Placeholder 2">
+            <a:extLst>
+              <a:ext uri="{FF2B5EF4-FFF2-40B4-BE49-F238E27FC236}">
+                <a16:creationId xmlns:a16="http://schemas.microsoft.com/office/drawing/2014/main" id="{1E7E8F2C-AEA8-421A-9DC9-D73A90CD6C73}"/>
+              </a:ext>
+            </a:extLst>
+          </p:cNvPr>
+          <p:cNvSpPr>
+            <a:spLocks noGrp="1"/>
+          </p:cNvSpPr>
+          <p:nvPr>
+            <p:ph idx="1"/>
+          </p:nvPr>
+        </p:nvSpPr>
+        <p:spPr/>
+        <p:txBody>
+          <a:bodyPr/>
+          <a:lstStyle/>
+          <a:p>
+            <a:endParaRPr lang="en-US"/>
+          </a:p>
+        </p:txBody>
+      </p:sp>
+    </p:spTree>
+    <p:extLst>
+      <p:ext uri="{BB962C8B-B14F-4D97-AF65-F5344CB8AC3E}">
+        <p14:creationId xmlns:p14="http://schemas.microsoft.com/office/powerpoint/2010/main" val="52210856"/>
+      </p:ext>
+    </p:extLst>
+  </p:cSld>
+  <p:clrMapOvr>
+    <a:masterClrMapping/>
+  </p:clrMapOvr>
+</p:sld>
+</file>
+
+<file path=ppt/slides/slide11.xml><?xml version="1.0" encoding="utf-8"?>
+<p:sld xmlns:a="http://schemas.openxmlformats.org/drawingml/2006/main" xmlns:r="http://schemas.openxmlformats.org/officeDocument/2006/relationships" xmlns:p="http://schemas.openxmlformats.org/presentationml/2006/main">
+  <p:cSld>
+    <p:spTree>
+      <p:nvGrpSpPr>
+        <p:cNvPr id="1" name=""/>
+        <p:cNvGrpSpPr/>
+        <p:nvPr/>
+      </p:nvGrpSpPr>
+      <p:grpSpPr>
+        <a:xfrm>
+          <a:off x="0" y="0"/>
+          <a:ext cx="0" cy="0"/>
+          <a:chOff x="0" y="0"/>
+          <a:chExt cx="0" cy="0"/>
+        </a:xfrm>
+      </p:grpSpPr>
+      <p:sp>
+        <p:nvSpPr>
+          <p:cNvPr id="2" name="Title 1">
+            <a:extLst>
+              <a:ext uri="{FF2B5EF4-FFF2-40B4-BE49-F238E27FC236}">
+                <a16:creationId xmlns:a16="http://schemas.microsoft.com/office/drawing/2014/main" id="{2ECA3CA4-2A62-4154-AA08-031883B42D6C}"/>
+              </a:ext>
+            </a:extLst>
+          </p:cNvPr>
+          <p:cNvSpPr>
+            <a:spLocks noGrp="1"/>
+          </p:cNvSpPr>
+          <p:nvPr>
+            <p:ph type="title"/>
+          </p:nvPr>
+        </p:nvSpPr>
+        <p:spPr/>
+        <p:txBody>
+          <a:bodyPr/>
+          <a:lstStyle/>
+          <a:p>
+            <a:r>
+              <a:rPr lang="sk-SK" dirty="0" err="1"/>
+              <a:t>Náměty</a:t>
+            </a:r>
+            <a:r>
+              <a:rPr lang="sk-SK" dirty="0"/>
+              <a:t> na </a:t>
+            </a:r>
+            <a:r>
+              <a:rPr lang="sk-SK" dirty="0" err="1"/>
+              <a:t>přídavné</a:t>
+            </a:r>
+            <a:r>
+              <a:rPr lang="sk-SK" dirty="0"/>
+              <a:t> cvičení</a:t>
+            </a:r>
+            <a:endParaRPr lang="en-US" dirty="0"/>
+          </a:p>
+        </p:txBody>
+      </p:sp>
+      <p:sp>
+        <p:nvSpPr>
+          <p:cNvPr id="3" name="Content Placeholder 2">
+            <a:extLst>
+              <a:ext uri="{FF2B5EF4-FFF2-40B4-BE49-F238E27FC236}">
+                <a16:creationId xmlns:a16="http://schemas.microsoft.com/office/drawing/2014/main" id="{524CEC56-64B6-4765-8E2A-33CDE3019535}"/>
+              </a:ext>
+            </a:extLst>
+          </p:cNvPr>
+          <p:cNvSpPr>
+            <a:spLocks noGrp="1"/>
+          </p:cNvSpPr>
+          <p:nvPr>
+            <p:ph idx="1"/>
+          </p:nvPr>
+        </p:nvSpPr>
+        <p:spPr/>
+        <p:txBody>
+          <a:bodyPr/>
+          <a:lstStyle/>
+          <a:p>
+            <a:pPr>
+              <a:buFont typeface="Arial" panose="020B0604020202020204" pitchFamily="34" charset="0"/>
+              <a:buChar char="•"/>
+            </a:pPr>
+            <a:r>
+              <a:rPr lang="sk-SK" dirty="0"/>
+              <a:t> </a:t>
+            </a:r>
+            <a:r>
+              <a:rPr lang="sk-SK" dirty="0" err="1"/>
+              <a:t>Stylování</a:t>
+            </a:r>
+            <a:r>
+              <a:rPr lang="sk-SK" dirty="0"/>
+              <a:t> a tvorba </a:t>
+            </a:r>
+            <a:r>
+              <a:rPr lang="sk-SK" dirty="0" err="1"/>
+              <a:t>vlastních</a:t>
+            </a:r>
+            <a:r>
+              <a:rPr lang="sk-SK" dirty="0"/>
+              <a:t> </a:t>
+            </a:r>
+            <a:r>
+              <a:rPr lang="sk-SK" dirty="0" err="1"/>
+              <a:t>kontrolek</a:t>
+            </a:r>
+            <a:endParaRPr lang="sk-SK" dirty="0"/>
+          </a:p>
+          <a:p>
+            <a:pPr>
+              <a:buFont typeface="Arial" panose="020B0604020202020204" pitchFamily="34" charset="0"/>
+              <a:buChar char="•"/>
+            </a:pPr>
+            <a:r>
+              <a:rPr lang="sk-SK" dirty="0"/>
+              <a:t> </a:t>
+            </a:r>
+            <a:r>
+              <a:rPr lang="sk-SK" dirty="0" err="1"/>
+              <a:t>Lokální</a:t>
+            </a:r>
+            <a:r>
+              <a:rPr lang="sk-SK" dirty="0"/>
+              <a:t> </a:t>
+            </a:r>
+            <a:r>
+              <a:rPr lang="sk-SK" dirty="0" err="1"/>
+              <a:t>cachování</a:t>
+            </a:r>
+            <a:r>
+              <a:rPr lang="sk-SK" dirty="0"/>
+              <a:t> </a:t>
+            </a:r>
+            <a:r>
+              <a:rPr lang="sk-SK" dirty="0" err="1"/>
+              <a:t>dat</a:t>
+            </a:r>
+            <a:endParaRPr lang="sk-SK" dirty="0"/>
+          </a:p>
+          <a:p>
+            <a:pPr>
+              <a:buFont typeface="Arial" panose="020B0604020202020204" pitchFamily="34" charset="0"/>
+              <a:buChar char="•"/>
+            </a:pPr>
+            <a:r>
+              <a:rPr lang="sk-SK" dirty="0"/>
+              <a:t> </a:t>
+            </a:r>
+            <a:r>
+              <a:rPr lang="sk-SK" dirty="0" err="1"/>
+              <a:t>Loading</a:t>
+            </a:r>
+            <a:r>
+              <a:rPr lang="sk-SK" dirty="0"/>
+              <a:t> </a:t>
+            </a:r>
+            <a:r>
+              <a:rPr lang="sk-SK" dirty="0" err="1"/>
+              <a:t>animace</a:t>
+            </a:r>
+            <a:endParaRPr lang="sk-SK" dirty="0"/>
+          </a:p>
+          <a:p>
+            <a:pPr>
+              <a:buFont typeface="Arial" panose="020B0604020202020204" pitchFamily="34" charset="0"/>
+              <a:buChar char="•"/>
+            </a:pPr>
+            <a:r>
+              <a:rPr lang="sk-SK" dirty="0"/>
+              <a:t> Tipy na užitočné nástroje a </a:t>
+            </a:r>
+            <a:r>
+              <a:rPr lang="sk-SK" dirty="0" err="1"/>
+              <a:t>rozšíření</a:t>
+            </a:r>
+            <a:endParaRPr lang="sk-SK" dirty="0"/>
+          </a:p>
+          <a:p>
+            <a:pPr>
+              <a:buFont typeface="Arial" panose="020B0604020202020204" pitchFamily="34" charset="0"/>
+              <a:buChar char="•"/>
+            </a:pPr>
+            <a:r>
+              <a:rPr lang="sk-SK" dirty="0"/>
+              <a:t> </a:t>
+            </a:r>
+            <a:r>
+              <a:rPr lang="sk-SK" dirty="0" err="1"/>
+              <a:t>Nějaké</a:t>
+            </a:r>
+            <a:r>
+              <a:rPr lang="sk-SK" dirty="0"/>
+              <a:t> vlastní?</a:t>
+            </a:r>
+            <a:endParaRPr lang="en-US" dirty="0"/>
+          </a:p>
+        </p:txBody>
+      </p:sp>
+    </p:spTree>
+    <p:extLst>
+      <p:ext uri="{BB962C8B-B14F-4D97-AF65-F5344CB8AC3E}">
+        <p14:creationId xmlns:p14="http://schemas.microsoft.com/office/powerpoint/2010/main" val="1641593906"/>
+      </p:ext>
+    </p:extLst>
+  </p:cSld>
+  <p:clrMapOvr>
+    <a:masterClrMapping/>
+  </p:clrMapOvr>
+</p:sld>
+</file>
+
 <file path=ppt/slides/slide2.xml><?xml version="1.0" encoding="utf-8"?>
+<p:sld xmlns:a="http://schemas.openxmlformats.org/drawingml/2006/main" xmlns:r="http://schemas.openxmlformats.org/officeDocument/2006/relationships" xmlns:p="http://schemas.openxmlformats.org/presentationml/2006/main">
+  <p:cSld>
+    <p:spTree>
+      <p:nvGrpSpPr>
+        <p:cNvPr id="1" name=""/>
+        <p:cNvGrpSpPr/>
+        <p:nvPr/>
+      </p:nvGrpSpPr>
+      <p:grpSpPr>
+        <a:xfrm>
+          <a:off x="0" y="0"/>
+          <a:ext cx="0" cy="0"/>
+          <a:chOff x="0" y="0"/>
+          <a:chExt cx="0" cy="0"/>
+        </a:xfrm>
+      </p:grpSpPr>
+      <p:sp>
+        <p:nvSpPr>
+          <p:cNvPr id="2" name="Title 1">
+            <a:extLst>
+              <a:ext uri="{FF2B5EF4-FFF2-40B4-BE49-F238E27FC236}">
+                <a16:creationId xmlns:a16="http://schemas.microsoft.com/office/drawing/2014/main" id="{62C39CA4-FF20-47F2-BE69-54C5748F6F65}"/>
+              </a:ext>
+            </a:extLst>
+          </p:cNvPr>
+          <p:cNvSpPr>
+            <a:spLocks noGrp="1"/>
+          </p:cNvSpPr>
+          <p:nvPr>
+            <p:ph type="title"/>
+          </p:nvPr>
+        </p:nvSpPr>
+        <p:spPr/>
+        <p:txBody>
+          <a:bodyPr/>
+          <a:lstStyle/>
+          <a:p>
+            <a:r>
+              <a:rPr lang="sk-SK" dirty="0" err="1"/>
+              <a:t>Opakování</a:t>
+            </a:r>
+            <a:endParaRPr lang="en-US" dirty="0"/>
+          </a:p>
+        </p:txBody>
+      </p:sp>
+      <p:sp>
+        <p:nvSpPr>
+          <p:cNvPr id="3" name="Content Placeholder 2">
+            <a:extLst>
+              <a:ext uri="{FF2B5EF4-FFF2-40B4-BE49-F238E27FC236}">
+                <a16:creationId xmlns:a16="http://schemas.microsoft.com/office/drawing/2014/main" id="{58DC1C2E-46C2-414B-AA8D-682F9BE576EF}"/>
+              </a:ext>
+            </a:extLst>
+          </p:cNvPr>
+          <p:cNvSpPr>
+            <a:spLocks noGrp="1"/>
+          </p:cNvSpPr>
+          <p:nvPr>
+            <p:ph idx="1"/>
+          </p:nvPr>
+        </p:nvSpPr>
+        <p:spPr/>
+        <p:txBody>
+          <a:bodyPr/>
+          <a:lstStyle/>
+          <a:p>
+            <a:pPr>
+              <a:buFont typeface="Arial" panose="020B0604020202020204" pitchFamily="34" charset="0"/>
+              <a:buChar char="•"/>
+            </a:pPr>
+            <a:r>
+              <a:rPr lang="sk-SK" dirty="0"/>
+              <a:t> </a:t>
+            </a:r>
+            <a:r>
+              <a:rPr lang="en-US" dirty="0"/>
+              <a:t>Co </a:t>
+            </a:r>
+            <a:r>
+              <a:rPr lang="en-US" dirty="0" err="1"/>
+              <a:t>znamen</a:t>
+            </a:r>
+            <a:r>
+              <a:rPr lang="sk-SK" dirty="0"/>
+              <a:t>á </a:t>
+            </a:r>
+            <a:r>
+              <a:rPr lang="sk-SK" dirty="0" err="1"/>
+              <a:t>zkratka</a:t>
+            </a:r>
+            <a:r>
+              <a:rPr lang="sk-SK" dirty="0"/>
+              <a:t> DI a k </a:t>
+            </a:r>
+            <a:r>
+              <a:rPr lang="sk-SK" dirty="0" err="1"/>
+              <a:t>čemu</a:t>
+            </a:r>
+            <a:r>
+              <a:rPr lang="sk-SK" dirty="0"/>
+              <a:t> nám </a:t>
+            </a:r>
+            <a:r>
+              <a:rPr lang="sk-SK" dirty="0" err="1"/>
+              <a:t>slouží</a:t>
+            </a:r>
+            <a:r>
+              <a:rPr lang="sk-SK" dirty="0"/>
+              <a:t>?</a:t>
+            </a:r>
+          </a:p>
+          <a:p>
+            <a:pPr>
+              <a:buFont typeface="Arial" panose="020B0604020202020204" pitchFamily="34" charset="0"/>
+              <a:buChar char="•"/>
+            </a:pPr>
+            <a:r>
+              <a:rPr lang="sk-SK" dirty="0"/>
+              <a:t> </a:t>
+            </a:r>
+            <a:r>
+              <a:rPr lang="sk-SK" dirty="0" err="1"/>
+              <a:t>Co</a:t>
+            </a:r>
+            <a:r>
+              <a:rPr lang="sk-SK" dirty="0"/>
+              <a:t> znamená </a:t>
+            </a:r>
+            <a:r>
+              <a:rPr lang="sk-SK" dirty="0" err="1"/>
+              <a:t>zkratka</a:t>
+            </a:r>
+            <a:r>
+              <a:rPr lang="sk-SK" dirty="0"/>
+              <a:t> </a:t>
+            </a:r>
+            <a:r>
+              <a:rPr lang="sk-SK" dirty="0" err="1"/>
+              <a:t>IoC</a:t>
+            </a:r>
+            <a:r>
+              <a:rPr lang="sk-SK" dirty="0"/>
+              <a:t> a k </a:t>
+            </a:r>
+            <a:r>
+              <a:rPr lang="sk-SK" dirty="0" err="1"/>
+              <a:t>čemu</a:t>
+            </a:r>
+            <a:r>
+              <a:rPr lang="sk-SK" dirty="0"/>
+              <a:t> nám </a:t>
+            </a:r>
+            <a:r>
+              <a:rPr lang="sk-SK" dirty="0" err="1"/>
+              <a:t>slouží</a:t>
+            </a:r>
+            <a:r>
+              <a:rPr lang="sk-SK" dirty="0"/>
+              <a:t>?</a:t>
+            </a:r>
+          </a:p>
+          <a:p>
+            <a:pPr>
+              <a:buFont typeface="Arial" panose="020B0604020202020204" pitchFamily="34" charset="0"/>
+              <a:buChar char="•"/>
+            </a:pPr>
+            <a:r>
+              <a:rPr lang="sk-SK" dirty="0"/>
+              <a:t> Na </a:t>
+            </a:r>
+            <a:r>
+              <a:rPr lang="sk-SK" dirty="0" err="1"/>
+              <a:t>co</a:t>
+            </a:r>
+            <a:r>
+              <a:rPr lang="sk-SK" dirty="0"/>
+              <a:t> </a:t>
+            </a:r>
+            <a:r>
+              <a:rPr lang="sk-SK" dirty="0" err="1"/>
+              <a:t>můžeme</a:t>
+            </a:r>
+            <a:r>
+              <a:rPr lang="sk-SK" dirty="0"/>
+              <a:t> </a:t>
+            </a:r>
+            <a:r>
+              <a:rPr lang="sk-SK" dirty="0" err="1"/>
+              <a:t>využít</a:t>
+            </a:r>
+            <a:r>
+              <a:rPr lang="sk-SK" dirty="0"/>
+              <a:t> </a:t>
+            </a:r>
+            <a:r>
+              <a:rPr lang="sk-SK" dirty="0" err="1"/>
+              <a:t>knihovnu</a:t>
+            </a:r>
+            <a:r>
+              <a:rPr lang="sk-SK" dirty="0"/>
+              <a:t> </a:t>
+            </a:r>
+            <a:r>
+              <a:rPr lang="sk-SK" dirty="0" err="1"/>
+              <a:t>Scrutor</a:t>
+            </a:r>
+            <a:r>
+              <a:rPr lang="sk-SK" dirty="0"/>
+              <a:t>?</a:t>
+            </a:r>
+          </a:p>
+        </p:txBody>
+      </p:sp>
+    </p:spTree>
+    <p:extLst>
+      <p:ext uri="{BB962C8B-B14F-4D97-AF65-F5344CB8AC3E}">
+        <p14:creationId xmlns:p14="http://schemas.microsoft.com/office/powerpoint/2010/main" val="1714944653"/>
+      </p:ext>
+    </p:extLst>
+  </p:cSld>
+  <p:clrMapOvr>
+    <a:masterClrMapping/>
+  </p:clrMapOvr>
+  <p:timing>
+    <p:tnLst>
+      <p:par>
+        <p:cTn id="1" dur="indefinite" restart="never" nodeType="tmRoot">
+          <p:childTnLst>
+            <p:seq concurrent="1" nextAc="seek">
+              <p:cTn id="2" dur="indefinite" nodeType="mainSeq">
+                <p:childTnLst>
+                  <p:par>
+                    <p:cTn id="3" fill="hold">
+                      <p:stCondLst>
+                        <p:cond delay="indefinite"/>
+                      </p:stCondLst>
+                      <p:childTnLst>
+                        <p:par>
+                          <p:cTn id="4" fill="hold">
+                            <p:stCondLst>
+                              <p:cond delay="0"/>
+                            </p:stCondLst>
+                            <p:childTnLst>
+                              <p:par>
+                                <p:cTn id="5" presetID="1" presetClass="entr" presetSubtype="0" fill="hold" grpId="0" nodeType="clickEffect">
+                                  <p:stCondLst>
+                                    <p:cond delay="0"/>
+                                  </p:stCondLst>
+                                  <p:childTnLst>
+                                    <p:set>
+                                      <p:cBhvr>
+                                        <p:cTn id="6" dur="1" fill="hold">
+                                          <p:stCondLst>
+                                            <p:cond delay="0"/>
+                                          </p:stCondLst>
+                                        </p:cTn>
+                                        <p:tgtEl>
+                                          <p:spTgt spid="3">
+                                            <p:txEl>
+                                              <p:pRg st="0" end="0"/>
+                                            </p:txEl>
+                                          </p:spTgt>
+                                        </p:tgtEl>
+                                        <p:attrNameLst>
+                                          <p:attrName>style.visibility</p:attrName>
+                                        </p:attrNameLst>
+                                      </p:cBhvr>
+                                      <p:to>
+                                        <p:strVal val="visible"/>
+                                      </p:to>
+                                    </p:set>
+                                  </p:childTnLst>
+                                </p:cTn>
+                              </p:par>
+                            </p:childTnLst>
+                          </p:cTn>
+                        </p:par>
+                      </p:childTnLst>
+                    </p:cTn>
+                  </p:par>
+                  <p:par>
+                    <p:cTn id="7" fill="hold">
+                      <p:stCondLst>
+                        <p:cond delay="indefinite"/>
+                      </p:stCondLst>
+                      <p:childTnLst>
+                        <p:par>
+                          <p:cTn id="8" fill="hold">
+                            <p:stCondLst>
+                              <p:cond delay="0"/>
+                            </p:stCondLst>
+                            <p:childTnLst>
+                              <p:par>
+                                <p:cTn id="9" presetID="1" presetClass="entr" presetSubtype="0" fill="hold" grpId="0" nodeType="clickEffect">
+                                  <p:stCondLst>
+                                    <p:cond delay="0"/>
+                                  </p:stCondLst>
+                                  <p:childTnLst>
+                                    <p:set>
+                                      <p:cBhvr>
+                                        <p:cTn id="10" dur="1" fill="hold">
+                                          <p:stCondLst>
+                                            <p:cond delay="0"/>
+                                          </p:stCondLst>
+                                        </p:cTn>
+                                        <p:tgtEl>
+                                          <p:spTgt spid="3">
+                                            <p:txEl>
+                                              <p:pRg st="1" end="1"/>
+                                            </p:txEl>
+                                          </p:spTgt>
+                                        </p:tgtEl>
+                                        <p:attrNameLst>
+                                          <p:attrName>style.visibility</p:attrName>
+                                        </p:attrNameLst>
+                                      </p:cBhvr>
+                                      <p:to>
+                                        <p:strVal val="visible"/>
+                                      </p:to>
+                                    </p:set>
+                                  </p:childTnLst>
+                                </p:cTn>
+                              </p:par>
+                            </p:childTnLst>
+                          </p:cTn>
+                        </p:par>
+                      </p:childTnLst>
+                    </p:cTn>
+                  </p:par>
+                  <p:par>
+                    <p:cTn id="11" fill="hold">
+                      <p:stCondLst>
+                        <p:cond delay="indefinite"/>
+                      </p:stCondLst>
+                      <p:childTnLst>
+                        <p:par>
+                          <p:cTn id="12" fill="hold">
+                            <p:stCondLst>
+                              <p:cond delay="0"/>
+                            </p:stCondLst>
+                            <p:childTnLst>
+                              <p:par>
+                                <p:cTn id="13" presetID="1" presetClass="entr" presetSubtype="0" fill="hold" grpId="0" nodeType="clickEffect">
+                                  <p:stCondLst>
+                                    <p:cond delay="0"/>
+                                  </p:stCondLst>
+                                  <p:childTnLst>
+                                    <p:set>
+                                      <p:cBhvr>
+                                        <p:cTn id="14" dur="1" fill="hold">
+                                          <p:stCondLst>
+                                            <p:cond delay="0"/>
+                                          </p:stCondLst>
+                                        </p:cTn>
+                                        <p:tgtEl>
+                                          <p:spTgt spid="3">
+                                            <p:txEl>
+                                              <p:pRg st="2" end="2"/>
+                                            </p:txEl>
+                                          </p:spTgt>
+                                        </p:tgtEl>
+                                        <p:attrNameLst>
+                                          <p:attrName>style.visibility</p:attrName>
+                                        </p:attrNameLst>
+                                      </p:cBhvr>
+                                      <p:to>
+                                        <p:strVal val="visible"/>
+                                      </p:to>
+                                    </p:set>
+                                  </p:childTnLst>
+                                </p:cTn>
+                              </p:par>
+                            </p:childTnLst>
+                          </p:cTn>
+                        </p:par>
+                      </p:childTnLst>
+                    </p:cTn>
+                  </p:par>
+                </p:childTnLst>
+              </p:cTn>
+              <p:prevCondLst>
+                <p:cond evt="onPrev" delay="0">
+                  <p:tgtEl>
+                    <p:sldTgt/>
+                  </p:tgtEl>
+                </p:cond>
+              </p:prevCondLst>
+              <p:nextCondLst>
+                <p:cond evt="onNext" delay="0">
+                  <p:tgtEl>
+                    <p:sldTgt/>
+                  </p:tgtEl>
+                </p:cond>
+              </p:nextCondLst>
+            </p:seq>
+          </p:childTnLst>
+        </p:cTn>
+      </p:par>
+    </p:tnLst>
+    <p:bldLst>
+      <p:bldP spid="3" grpId="0" build="p"/>
+    </p:bldLst>
+  </p:timing>
+</p:sld>
+</file>
+
+<file path=ppt/slides/slide3.xml><?xml version="1.0" encoding="utf-8"?>
 <p:sld xmlns:a="http://schemas.openxmlformats.org/drawingml/2006/main" xmlns:r="http://schemas.openxmlformats.org/officeDocument/2006/relationships" xmlns:p="http://schemas.openxmlformats.org/presentationml/2006/main">
   <p:cSld>
     <p:spTree>
@@ -21966,7 +22700,7 @@
 </p:sld>
 </file>
 
-<file path=ppt/slides/slide3.xml><?xml version="1.0" encoding="utf-8"?>
+<file path=ppt/slides/slide4.xml><?xml version="1.0" encoding="utf-8"?>
 <p:sld xmlns:a="http://schemas.openxmlformats.org/drawingml/2006/main" xmlns:r="http://schemas.openxmlformats.org/officeDocument/2006/relationships" xmlns:p="http://schemas.openxmlformats.org/presentationml/2006/main">
   <p:cSld>
     <p:spTree>
@@ -22554,7 +23288,7 @@
 </p:sld>
 </file>
 
-<file path=ppt/slides/slide4.xml><?xml version="1.0" encoding="utf-8"?>
+<file path=ppt/slides/slide5.xml><?xml version="1.0" encoding="utf-8"?>
 <p:sld xmlns:a="http://schemas.openxmlformats.org/drawingml/2006/main" xmlns:r="http://schemas.openxmlformats.org/officeDocument/2006/relationships" xmlns:p="http://schemas.openxmlformats.org/presentationml/2006/main">
   <p:cSld>
     <p:spTree>
@@ -22904,7 +23638,7 @@
 </p:sld>
 </file>
 
-<file path=ppt/slides/slide5.xml><?xml version="1.0" encoding="utf-8"?>
+<file path=ppt/slides/slide6.xml><?xml version="1.0" encoding="utf-8"?>
 <p:sld xmlns:a="http://schemas.openxmlformats.org/drawingml/2006/main" xmlns:r="http://schemas.openxmlformats.org/officeDocument/2006/relationships" xmlns:p="http://schemas.openxmlformats.org/presentationml/2006/main">
   <p:cSld>
     <p:spTree>
@@ -23443,7 +24177,7 @@
 </p:sld>
 </file>
 
-<file path=ppt/slides/slide6.xml><?xml version="1.0" encoding="utf-8"?>
+<file path=ppt/slides/slide7.xml><?xml version="1.0" encoding="utf-8"?>
 <p:sld xmlns:a="http://schemas.openxmlformats.org/drawingml/2006/main" xmlns:r="http://schemas.openxmlformats.org/officeDocument/2006/relationships" xmlns:p="http://schemas.openxmlformats.org/presentationml/2006/main">
   <p:cSld>
     <p:spTree>
@@ -24064,6 +24798,173 @@
 </p:sld>
 </file>
 
+<file path=ppt/slides/slide8.xml><?xml version="1.0" encoding="utf-8"?>
+<p:sld xmlns:a="http://schemas.openxmlformats.org/drawingml/2006/main" xmlns:r="http://schemas.openxmlformats.org/officeDocument/2006/relationships" xmlns:p="http://schemas.openxmlformats.org/presentationml/2006/main">
+  <p:cSld>
+    <p:spTree>
+      <p:nvGrpSpPr>
+        <p:cNvPr id="1" name=""/>
+        <p:cNvGrpSpPr/>
+        <p:nvPr/>
+      </p:nvGrpSpPr>
+      <p:grpSpPr>
+        <a:xfrm>
+          <a:off x="0" y="0"/>
+          <a:ext cx="0" cy="0"/>
+          <a:chOff x="0" y="0"/>
+          <a:chExt cx="0" cy="0"/>
+        </a:xfrm>
+      </p:grpSpPr>
+      <p:sp>
+        <p:nvSpPr>
+          <p:cNvPr id="2" name="Title 1">
+            <a:extLst>
+              <a:ext uri="{FF2B5EF4-FFF2-40B4-BE49-F238E27FC236}">
+                <a16:creationId xmlns:a16="http://schemas.microsoft.com/office/drawing/2014/main" id="{379933E6-AEBA-4B11-9DAB-44FD18346C4A}"/>
+              </a:ext>
+            </a:extLst>
+          </p:cNvPr>
+          <p:cNvSpPr>
+            <a:spLocks noGrp="1"/>
+          </p:cNvSpPr>
+          <p:nvPr>
+            <p:ph type="title"/>
+          </p:nvPr>
+        </p:nvSpPr>
+        <p:spPr/>
+        <p:txBody>
+          <a:bodyPr/>
+          <a:lstStyle/>
+          <a:p>
+            <a:r>
+              <a:rPr lang="en-US" dirty="0"/>
+              <a:t>Converter</a:t>
+            </a:r>
+          </a:p>
+        </p:txBody>
+      </p:sp>
+      <p:sp>
+        <p:nvSpPr>
+          <p:cNvPr id="3" name="Content Placeholder 2">
+            <a:extLst>
+              <a:ext uri="{FF2B5EF4-FFF2-40B4-BE49-F238E27FC236}">
+                <a16:creationId xmlns:a16="http://schemas.microsoft.com/office/drawing/2014/main" id="{711467BE-F70C-468D-9081-0BE6CB82B756}"/>
+              </a:ext>
+            </a:extLst>
+          </p:cNvPr>
+          <p:cNvSpPr>
+            <a:spLocks noGrp="1"/>
+          </p:cNvSpPr>
+          <p:nvPr>
+            <p:ph idx="1"/>
+          </p:nvPr>
+        </p:nvSpPr>
+        <p:spPr/>
+        <p:txBody>
+          <a:bodyPr/>
+          <a:lstStyle/>
+          <a:p>
+            <a:endParaRPr lang="en-US"/>
+          </a:p>
+        </p:txBody>
+      </p:sp>
+    </p:spTree>
+    <p:extLst>
+      <p:ext uri="{BB962C8B-B14F-4D97-AF65-F5344CB8AC3E}">
+        <p14:creationId xmlns:p14="http://schemas.microsoft.com/office/powerpoint/2010/main" val="4096394136"/>
+      </p:ext>
+    </p:extLst>
+  </p:cSld>
+  <p:clrMapOvr>
+    <a:masterClrMapping/>
+  </p:clrMapOvr>
+</p:sld>
+</file>
+
+<file path=ppt/slides/slide9.xml><?xml version="1.0" encoding="utf-8"?>
+<p:sld xmlns:a="http://schemas.openxmlformats.org/drawingml/2006/main" xmlns:r="http://schemas.openxmlformats.org/officeDocument/2006/relationships" xmlns:p="http://schemas.openxmlformats.org/presentationml/2006/main">
+  <p:cSld>
+    <p:spTree>
+      <p:nvGrpSpPr>
+        <p:cNvPr id="1" name=""/>
+        <p:cNvGrpSpPr/>
+        <p:nvPr/>
+      </p:nvGrpSpPr>
+      <p:grpSpPr>
+        <a:xfrm>
+          <a:off x="0" y="0"/>
+          <a:ext cx="0" cy="0"/>
+          <a:chOff x="0" y="0"/>
+          <a:chExt cx="0" cy="0"/>
+        </a:xfrm>
+      </p:grpSpPr>
+      <p:sp>
+        <p:nvSpPr>
+          <p:cNvPr id="2" name="Title 1">
+            <a:extLst>
+              <a:ext uri="{FF2B5EF4-FFF2-40B4-BE49-F238E27FC236}">
+                <a16:creationId xmlns:a16="http://schemas.microsoft.com/office/drawing/2014/main" id="{C26051A9-C195-4079-B8DA-540C589AD73D}"/>
+              </a:ext>
+            </a:extLst>
+          </p:cNvPr>
+          <p:cNvSpPr>
+            <a:spLocks noGrp="1"/>
+          </p:cNvSpPr>
+          <p:nvPr>
+            <p:ph type="title"/>
+          </p:nvPr>
+        </p:nvSpPr>
+        <p:spPr/>
+        <p:txBody>
+          <a:bodyPr/>
+          <a:lstStyle/>
+          <a:p>
+            <a:r>
+              <a:rPr lang="en-US" dirty="0" err="1"/>
+              <a:t>EventTocommandBehavior</a:t>
+            </a:r>
+            <a:endParaRPr lang="en-US" dirty="0"/>
+          </a:p>
+        </p:txBody>
+      </p:sp>
+      <p:sp>
+        <p:nvSpPr>
+          <p:cNvPr id="3" name="Content Placeholder 2">
+            <a:extLst>
+              <a:ext uri="{FF2B5EF4-FFF2-40B4-BE49-F238E27FC236}">
+                <a16:creationId xmlns:a16="http://schemas.microsoft.com/office/drawing/2014/main" id="{130CFC1E-C14A-4C25-A149-A0D8CE7BE057}"/>
+              </a:ext>
+            </a:extLst>
+          </p:cNvPr>
+          <p:cNvSpPr>
+            <a:spLocks noGrp="1"/>
+          </p:cNvSpPr>
+          <p:nvPr>
+            <p:ph idx="1"/>
+          </p:nvPr>
+        </p:nvSpPr>
+        <p:spPr/>
+        <p:txBody>
+          <a:bodyPr/>
+          <a:lstStyle/>
+          <a:p>
+            <a:endParaRPr lang="en-US" dirty="0"/>
+          </a:p>
+        </p:txBody>
+      </p:sp>
+    </p:spTree>
+    <p:extLst>
+      <p:ext uri="{BB962C8B-B14F-4D97-AF65-F5344CB8AC3E}">
+        <p14:creationId xmlns:p14="http://schemas.microsoft.com/office/powerpoint/2010/main" val="3058864888"/>
+      </p:ext>
+    </p:extLst>
+  </p:cSld>
+  <p:clrMapOvr>
+    <a:masterClrMapping/>
+  </p:clrMapOvr>
+</p:sld>
+</file>
+
 <file path=ppt/theme/theme1.xml><?xml version="1.0" encoding="utf-8"?>
 <a:theme xmlns:a="http://schemas.openxmlformats.org/drawingml/2006/main" name="Integral">
   <a:themeElements>

</xml_diff>

<commit_message>
Added working with database to code for lab 05
</commit_message>
<xml_diff>
--- a/05_Storage/PV239-Xamarin-05_Storage.pptx
+++ b/05_Storage/PV239-Xamarin-05_Storage.pptx
@@ -5,7 +5,7 @@
     <p:sldMasterId id="2147483700" r:id="rId1"/>
   </p:sldMasterIdLst>
   <p:notesMasterIdLst>
-    <p:notesMasterId r:id="rId13"/>
+    <p:notesMasterId r:id="rId14"/>
   </p:notesMasterIdLst>
   <p:sldIdLst>
     <p:sldId id="256" r:id="rId2"/>
@@ -18,7 +18,8 @@
     <p:sldId id="396" r:id="rId9"/>
     <p:sldId id="397" r:id="rId10"/>
     <p:sldId id="398" r:id="rId11"/>
-    <p:sldId id="395" r:id="rId12"/>
+    <p:sldId id="399" r:id="rId12"/>
+    <p:sldId id="395" r:id="rId13"/>
   </p:sldIdLst>
   <p:sldSz cx="12192000" cy="6858000"/>
   <p:notesSz cx="6858000" cy="9144000"/>
@@ -21329,9 +21330,10 @@
           <a:lstStyle/>
           <a:p>
             <a:r>
-              <a:rPr lang="en-US"/>
+              <a:rPr lang="en-US" dirty="0" err="1"/>
               <a:t>lokalizace</a:t>
             </a:r>
+            <a:endParaRPr lang="en-US" dirty="0"/>
           </a:p>
         </p:txBody>
       </p:sp>
@@ -21395,6 +21397,89 @@
           <p:cNvPr id="2" name="Title 1">
             <a:extLst>
               <a:ext uri="{FF2B5EF4-FFF2-40B4-BE49-F238E27FC236}">
+                <a16:creationId xmlns:a16="http://schemas.microsoft.com/office/drawing/2014/main" id="{E5A8BD86-A491-489A-BEB1-9A8A38275474}"/>
+              </a:ext>
+            </a:extLst>
+          </p:cNvPr>
+          <p:cNvSpPr>
+            <a:spLocks noGrp="1"/>
+          </p:cNvSpPr>
+          <p:nvPr>
+            <p:ph type="title"/>
+          </p:nvPr>
+        </p:nvSpPr>
+        <p:spPr/>
+        <p:txBody>
+          <a:bodyPr/>
+          <a:lstStyle/>
+          <a:p>
+            <a:r>
+              <a:rPr lang="en-US"/>
+              <a:t>Automapper</a:t>
+            </a:r>
+          </a:p>
+        </p:txBody>
+      </p:sp>
+      <p:sp>
+        <p:nvSpPr>
+          <p:cNvPr id="3" name="Content Placeholder 2">
+            <a:extLst>
+              <a:ext uri="{FF2B5EF4-FFF2-40B4-BE49-F238E27FC236}">
+                <a16:creationId xmlns:a16="http://schemas.microsoft.com/office/drawing/2014/main" id="{F55FC223-6B70-4006-9428-17B49BCB08BE}"/>
+              </a:ext>
+            </a:extLst>
+          </p:cNvPr>
+          <p:cNvSpPr>
+            <a:spLocks noGrp="1"/>
+          </p:cNvSpPr>
+          <p:nvPr>
+            <p:ph idx="1"/>
+          </p:nvPr>
+        </p:nvSpPr>
+        <p:spPr/>
+        <p:txBody>
+          <a:bodyPr/>
+          <a:lstStyle/>
+          <a:p>
+            <a:endParaRPr lang="en-US"/>
+          </a:p>
+        </p:txBody>
+      </p:sp>
+    </p:spTree>
+    <p:extLst>
+      <p:ext uri="{BB962C8B-B14F-4D97-AF65-F5344CB8AC3E}">
+        <p14:creationId xmlns:p14="http://schemas.microsoft.com/office/powerpoint/2010/main" val="3527172694"/>
+      </p:ext>
+    </p:extLst>
+  </p:cSld>
+  <p:clrMapOvr>
+    <a:masterClrMapping/>
+  </p:clrMapOvr>
+</p:sld>
+</file>
+
+<file path=ppt/slides/slide12.xml><?xml version="1.0" encoding="utf-8"?>
+<p:sld xmlns:a="http://schemas.openxmlformats.org/drawingml/2006/main" xmlns:r="http://schemas.openxmlformats.org/officeDocument/2006/relationships" xmlns:p="http://schemas.openxmlformats.org/presentationml/2006/main">
+  <p:cSld>
+    <p:spTree>
+      <p:nvGrpSpPr>
+        <p:cNvPr id="1" name=""/>
+        <p:cNvGrpSpPr/>
+        <p:nvPr/>
+      </p:nvGrpSpPr>
+      <p:grpSpPr>
+        <a:xfrm>
+          <a:off x="0" y="0"/>
+          <a:ext cx="0" cy="0"/>
+          <a:chOff x="0" y="0"/>
+          <a:chExt cx="0" cy="0"/>
+        </a:xfrm>
+      </p:grpSpPr>
+      <p:sp>
+        <p:nvSpPr>
+          <p:cNvPr id="2" name="Title 1">
+            <a:extLst>
+              <a:ext uri="{FF2B5EF4-FFF2-40B4-BE49-F238E27FC236}">
                 <a16:creationId xmlns:a16="http://schemas.microsoft.com/office/drawing/2014/main" id="{2ECA3CA4-2A62-4154-AA08-031883B42D6C}"/>
               </a:ext>
             </a:extLst>
@@ -21534,7 +21619,57 @@
               <a:rPr lang="sk-SK" dirty="0" err="1"/>
               <a:t>animace</a:t>
             </a:r>
-            <a:endParaRPr lang="sk-SK" dirty="0"/>
+            <a:endParaRPr lang="en-US" dirty="0"/>
+          </a:p>
+          <a:p>
+            <a:pPr>
+              <a:buFont typeface="Arial" panose="020B0604020202020204" pitchFamily="34" charset="0"/>
+              <a:buChar char="•"/>
+            </a:pPr>
+            <a:r>
+              <a:rPr lang="en-US" dirty="0"/>
+              <a:t> </a:t>
+            </a:r>
+            <a:r>
+              <a:rPr lang="en-US" dirty="0" err="1"/>
+              <a:t>Konfigurace</a:t>
+            </a:r>
+            <a:r>
+              <a:rPr lang="en-US" dirty="0"/>
+              <a:t> aplikace pro r</a:t>
+            </a:r>
+            <a:r>
+              <a:rPr lang="sk-SK" dirty="0" err="1"/>
+              <a:t>ůzná</a:t>
+            </a:r>
+            <a:r>
+              <a:rPr lang="sk-SK" dirty="0"/>
+              <a:t> </a:t>
+            </a:r>
+            <a:r>
+              <a:rPr lang="sk-SK" dirty="0" err="1"/>
+              <a:t>prostředí</a:t>
+            </a:r>
+            <a:r>
+              <a:rPr lang="sk-SK" dirty="0"/>
+              <a:t> (</a:t>
+            </a:r>
+            <a:r>
+              <a:rPr lang="sk-SK" dirty="0" err="1"/>
+              <a:t>dev</a:t>
+            </a:r>
+            <a:r>
+              <a:rPr lang="sk-SK" dirty="0"/>
+              <a:t>, test, </a:t>
+            </a:r>
+            <a:r>
+              <a:rPr lang="sk-SK" dirty="0" err="1"/>
+              <a:t>produkce</a:t>
+            </a:r>
+            <a:r>
+              <a:rPr lang="sk-SK" dirty="0"/>
+              <a:t>)</a:t>
+            </a:r>
           </a:p>
           <a:p>
             <a:pPr>

</xml_diff>